<commit_message>
Slides: extended + improved
</commit_message>
<xml_diff>
--- a/Slides/TypeClasses.pptx
+++ b/Slides/TypeClasses.pptx
@@ -2748,7 +2748,7 @@
         <p:spPr>
           <a:xfrm>
             <a:off x="0" y="4320000"/>
-            <a:ext cx="497880" cy="1073880"/>
+            <a:ext cx="497160" cy="1073160"/>
           </a:xfrm>
           <a:prstGeom prst="rect">
             <a:avLst/>
@@ -3027,7 +3027,7 @@
         <p:spPr>
           <a:xfrm>
             <a:off x="0" y="288000"/>
-            <a:ext cx="497880" cy="1073880"/>
+            <a:ext cx="497160" cy="1073160"/>
           </a:xfrm>
           <a:prstGeom prst="rect">
             <a:avLst/>
@@ -3306,7 +3306,7 @@
         <p:spPr>
           <a:xfrm>
             <a:off x="792000" y="3885480"/>
-            <a:ext cx="8561880" cy="1655280"/>
+            <a:ext cx="8561160" cy="1654560"/>
           </a:xfrm>
           <a:prstGeom prst="rect">
             <a:avLst/>
@@ -3363,7 +3363,7 @@
         <p:spPr>
           <a:xfrm>
             <a:off x="792000" y="5904000"/>
-            <a:ext cx="8561880" cy="976320"/>
+            <a:ext cx="8561160" cy="975600"/>
           </a:xfrm>
           <a:prstGeom prst="rect">
             <a:avLst/>
@@ -3471,7 +3471,7 @@
         <p:spPr>
           <a:xfrm>
             <a:off x="720000" y="300960"/>
-            <a:ext cx="8849520" cy="1256400"/>
+            <a:ext cx="8848800" cy="1255680"/>
           </a:xfrm>
           <a:prstGeom prst="rect">
             <a:avLst/>
@@ -3515,7 +3515,7 @@
         <p:spPr>
           <a:xfrm>
             <a:off x="720000" y="1944000"/>
-            <a:ext cx="8633880" cy="4378680"/>
+            <a:ext cx="8633160" cy="4377960"/>
           </a:xfrm>
           <a:prstGeom prst="rect">
             <a:avLst/>
@@ -3534,7 +3534,7 @@
         <p:txBody>
           <a:bodyPr lIns="0" rIns="0" tIns="0" bIns="0"/>
           <a:p>
-            <a:pPr marL="432000" indent="-317880">
+            <a:pPr marL="432000" indent="-317160">
               <a:lnSpc>
                 <a:spcPct val="100000"/>
               </a:lnSpc>
@@ -3563,7 +3563,7 @@
             </a:endParaRPr>
           </a:p>
           <a:p>
-            <a:pPr marL="432000" indent="-317880">
+            <a:pPr marL="432000" indent="-317160">
               <a:lnSpc>
                 <a:spcPct val="100000"/>
               </a:lnSpc>
@@ -3592,7 +3592,7 @@
             </a:endParaRPr>
           </a:p>
           <a:p>
-            <a:pPr marL="432000" indent="-317880">
+            <a:pPr marL="432000" indent="-317160">
               <a:lnSpc>
                 <a:spcPct val="100000"/>
               </a:lnSpc>
@@ -3621,7 +3621,7 @@
             </a:endParaRPr>
           </a:p>
           <a:p>
-            <a:pPr marL="432000" indent="-317880">
+            <a:pPr marL="432000" indent="-317160">
               <a:lnSpc>
                 <a:spcPct val="100000"/>
               </a:lnSpc>
@@ -3650,7 +3650,7 @@
             </a:endParaRPr>
           </a:p>
           <a:p>
-            <a:pPr marL="432000" indent="-317880">
+            <a:pPr marL="432000" indent="-317160">
               <a:lnSpc>
                 <a:spcPct val="100000"/>
               </a:lnSpc>
@@ -3778,7 +3778,7 @@
         <p:spPr>
           <a:xfrm>
             <a:off x="720000" y="300960"/>
-            <a:ext cx="8849520" cy="1256400"/>
+            <a:ext cx="8848800" cy="1255680"/>
           </a:xfrm>
           <a:prstGeom prst="rect">
             <a:avLst/>
@@ -3822,7 +3822,7 @@
         <p:spPr>
           <a:xfrm>
             <a:off x="720000" y="2160000"/>
-            <a:ext cx="8633880" cy="4378680"/>
+            <a:ext cx="8633160" cy="4377960"/>
           </a:xfrm>
           <a:prstGeom prst="rect">
             <a:avLst/>
@@ -4242,7 +4242,7 @@
         <p:spPr>
           <a:xfrm>
             <a:off x="720000" y="300960"/>
-            <a:ext cx="8849520" cy="1256400"/>
+            <a:ext cx="8848800" cy="1255680"/>
           </a:xfrm>
           <a:prstGeom prst="rect">
             <a:avLst/>
@@ -4286,7 +4286,7 @@
         <p:spPr>
           <a:xfrm>
             <a:off x="720000" y="2160000"/>
-            <a:ext cx="8633880" cy="4378680"/>
+            <a:ext cx="8633160" cy="4377960"/>
           </a:xfrm>
           <a:prstGeom prst="rect">
             <a:avLst/>
@@ -4305,7 +4305,7 @@
         <p:txBody>
           <a:bodyPr lIns="0" rIns="0" tIns="0" bIns="0"/>
           <a:p>
-            <a:pPr marL="432000" indent="-317880">
+            <a:pPr marL="432000" indent="-317160">
               <a:lnSpc>
                 <a:spcPct val="100000"/>
               </a:lnSpc>
@@ -4334,7 +4334,7 @@
             </a:endParaRPr>
           </a:p>
           <a:p>
-            <a:pPr marL="432000" indent="-317880">
+            <a:pPr marL="432000" indent="-317160">
               <a:lnSpc>
                 <a:spcPct val="100000"/>
               </a:lnSpc>
@@ -4363,7 +4363,7 @@
             </a:endParaRPr>
           </a:p>
           <a:p>
-            <a:pPr marL="432000" indent="-317880">
+            <a:pPr marL="432000" indent="-317160">
               <a:lnSpc>
                 <a:spcPct val="100000"/>
               </a:lnSpc>
@@ -4403,7 +4403,7 @@
             </a:endParaRPr>
           </a:p>
           <a:p>
-            <a:pPr marL="432000" indent="-317880">
+            <a:pPr marL="432000" indent="-317160">
               <a:lnSpc>
                 <a:spcPct val="100000"/>
               </a:lnSpc>
@@ -4432,7 +4432,7 @@
             </a:endParaRPr>
           </a:p>
           <a:p>
-            <a:pPr marL="432000" indent="-317880">
+            <a:pPr marL="432000" indent="-317160">
               <a:lnSpc>
                 <a:spcPct val="100000"/>
               </a:lnSpc>
@@ -4461,7 +4461,7 @@
             </a:endParaRPr>
           </a:p>
           <a:p>
-            <a:pPr marL="432000" indent="-317880">
+            <a:pPr marL="432000" indent="-317160">
               <a:lnSpc>
                 <a:spcPct val="100000"/>
               </a:lnSpc>
@@ -4490,7 +4490,7 @@
             </a:endParaRPr>
           </a:p>
           <a:p>
-            <a:pPr marL="432000" indent="-317880">
+            <a:pPr marL="432000" indent="-317160">
               <a:lnSpc>
                 <a:spcPct val="100000"/>
               </a:lnSpc>
@@ -4578,7 +4578,7 @@
         <p:spPr>
           <a:xfrm>
             <a:off x="720000" y="300960"/>
-            <a:ext cx="8849520" cy="1256400"/>
+            <a:ext cx="8848800" cy="1255680"/>
           </a:xfrm>
           <a:prstGeom prst="rect">
             <a:avLst/>
@@ -4622,7 +4622,7 @@
         <p:spPr>
           <a:xfrm>
             <a:off x="720000" y="2160000"/>
-            <a:ext cx="8633880" cy="4378680"/>
+            <a:ext cx="8633160" cy="4377960"/>
           </a:xfrm>
           <a:prstGeom prst="rect">
             <a:avLst/>
@@ -4641,7 +4641,7 @@
         <p:txBody>
           <a:bodyPr lIns="0" rIns="0" tIns="0" bIns="0"/>
           <a:p>
-            <a:pPr marL="432000" indent="-317880">
+            <a:pPr marL="432000" indent="-317160">
               <a:lnSpc>
                 <a:spcPct val="100000"/>
               </a:lnSpc>
@@ -4691,7 +4691,7 @@
             </a:endParaRPr>
           </a:p>
           <a:p>
-            <a:pPr marL="432000" indent="-317880">
+            <a:pPr marL="432000" indent="-317160">
               <a:lnSpc>
                 <a:spcPct val="100000"/>
               </a:lnSpc>
@@ -4822,7 +4822,7 @@
             </a:endParaRPr>
           </a:p>
           <a:p>
-            <a:pPr marL="432000" indent="-317880">
+            <a:pPr marL="432000" indent="-317160">
               <a:lnSpc>
                 <a:spcPct val="100000"/>
               </a:lnSpc>
@@ -4931,7 +4931,7 @@
         <p:spPr>
           <a:xfrm>
             <a:off x="720000" y="300960"/>
-            <a:ext cx="8849520" cy="1256400"/>
+            <a:ext cx="8848800" cy="1255680"/>
           </a:xfrm>
           <a:prstGeom prst="rect">
             <a:avLst/>
@@ -4975,7 +4975,7 @@
         <p:spPr>
           <a:xfrm>
             <a:off x="720000" y="2160000"/>
-            <a:ext cx="8633880" cy="4378680"/>
+            <a:ext cx="8633160" cy="4377960"/>
           </a:xfrm>
           <a:prstGeom prst="rect">
             <a:avLst/>
@@ -5258,7 +5258,7 @@
         <p:spPr>
           <a:xfrm>
             <a:off x="720000" y="300960"/>
-            <a:ext cx="8849520" cy="1256400"/>
+            <a:ext cx="8848800" cy="1255680"/>
           </a:xfrm>
           <a:prstGeom prst="rect">
             <a:avLst/>
@@ -5302,7 +5302,7 @@
         <p:spPr>
           <a:xfrm>
             <a:off x="720000" y="1764000"/>
-            <a:ext cx="8633880" cy="4378680"/>
+            <a:ext cx="8633160" cy="4377960"/>
           </a:xfrm>
           <a:prstGeom prst="rect">
             <a:avLst/>
@@ -5956,7 +5956,7 @@
         <p:spPr>
           <a:xfrm>
             <a:off x="720000" y="300960"/>
-            <a:ext cx="8849520" cy="1256400"/>
+            <a:ext cx="8848800" cy="1255680"/>
           </a:xfrm>
           <a:prstGeom prst="rect">
             <a:avLst/>
@@ -6000,7 +6000,7 @@
         <p:spPr>
           <a:xfrm>
             <a:off x="720000" y="2160000"/>
-            <a:ext cx="8633880" cy="4378680"/>
+            <a:ext cx="8633160" cy="4377960"/>
           </a:xfrm>
           <a:prstGeom prst="rect">
             <a:avLst/>
@@ -6513,7 +6513,7 @@
         <p:spPr>
           <a:xfrm>
             <a:off x="720000" y="300960"/>
-            <a:ext cx="8849520" cy="1256400"/>
+            <a:ext cx="8848800" cy="1255680"/>
           </a:xfrm>
           <a:prstGeom prst="rect">
             <a:avLst/>
@@ -6557,7 +6557,7 @@
         <p:spPr>
           <a:xfrm>
             <a:off x="720000" y="1800000"/>
-            <a:ext cx="8633880" cy="5322600"/>
+            <a:ext cx="8633160" cy="5321880"/>
           </a:xfrm>
           <a:prstGeom prst="rect">
             <a:avLst/>
@@ -7225,7 +7225,7 @@
         <p:spPr>
           <a:xfrm>
             <a:off x="720000" y="300960"/>
-            <a:ext cx="8849520" cy="1256400"/>
+            <a:ext cx="8848800" cy="1255680"/>
           </a:xfrm>
           <a:prstGeom prst="rect">
             <a:avLst/>
@@ -7269,7 +7269,7 @@
         <p:spPr>
           <a:xfrm>
             <a:off x="720000" y="1800000"/>
-            <a:ext cx="8633880" cy="5322600"/>
+            <a:ext cx="8633160" cy="5321880"/>
           </a:xfrm>
           <a:prstGeom prst="rect">
             <a:avLst/>
@@ -7819,7 +7819,7 @@
         <p:spPr>
           <a:xfrm>
             <a:off x="720000" y="300960"/>
-            <a:ext cx="8849520" cy="1256400"/>
+            <a:ext cx="8848800" cy="1255680"/>
           </a:xfrm>
           <a:prstGeom prst="rect">
             <a:avLst/>
@@ -7863,7 +7863,7 @@
         <p:spPr>
           <a:xfrm>
             <a:off x="720000" y="2160000"/>
-            <a:ext cx="8633880" cy="4378680"/>
+            <a:ext cx="8633160" cy="4377960"/>
           </a:xfrm>
           <a:prstGeom prst="rect">
             <a:avLst/>
@@ -8331,7 +8331,7 @@
         <p:spPr>
           <a:xfrm>
             <a:off x="720000" y="300960"/>
-            <a:ext cx="8849520" cy="1256400"/>
+            <a:ext cx="8848800" cy="1255680"/>
           </a:xfrm>
           <a:prstGeom prst="rect">
             <a:avLst/>
@@ -8375,7 +8375,7 @@
         <p:spPr>
           <a:xfrm>
             <a:off x="720000" y="1656000"/>
-            <a:ext cx="8633880" cy="5399280"/>
+            <a:ext cx="8633160" cy="5398560"/>
           </a:xfrm>
           <a:prstGeom prst="rect">
             <a:avLst/>
@@ -8394,7 +8394,7 @@
         <p:txBody>
           <a:bodyPr lIns="0" rIns="0" tIns="0" bIns="0"/>
           <a:p>
-            <a:pPr marL="432000" indent="-317880">
+            <a:pPr marL="432000" indent="-317160">
               <a:lnSpc>
                 <a:spcPct val="100000"/>
               </a:lnSpc>
@@ -8423,7 +8423,7 @@
             </a:endParaRPr>
           </a:p>
           <a:p>
-            <a:pPr marL="432000" indent="-317880">
+            <a:pPr marL="432000" indent="-317160">
               <a:lnSpc>
                 <a:spcPct val="100000"/>
               </a:lnSpc>
@@ -8452,7 +8452,7 @@
             </a:endParaRPr>
           </a:p>
           <a:p>
-            <a:pPr marL="432000" indent="-317880">
+            <a:pPr marL="432000" indent="-317160">
               <a:lnSpc>
                 <a:spcPct val="100000"/>
               </a:lnSpc>
@@ -8481,7 +8481,7 @@
             </a:endParaRPr>
           </a:p>
           <a:p>
-            <a:pPr marL="432000" indent="-317880">
+            <a:pPr marL="432000" indent="-317160">
               <a:lnSpc>
                 <a:spcPct val="100000"/>
               </a:lnSpc>
@@ -8510,7 +8510,7 @@
             </a:endParaRPr>
           </a:p>
           <a:p>
-            <a:pPr marL="432000" indent="-317880">
+            <a:pPr marL="432000" indent="-317160">
               <a:lnSpc>
                 <a:spcPct val="100000"/>
               </a:lnSpc>
@@ -8549,7 +8549,7 @@
             </a:endParaRPr>
           </a:p>
           <a:p>
-            <a:pPr marL="432000" indent="-317880">
+            <a:pPr marL="432000" indent="-317160">
               <a:lnSpc>
                 <a:spcPct val="100000"/>
               </a:lnSpc>
@@ -8578,7 +8578,7 @@
             </a:endParaRPr>
           </a:p>
           <a:p>
-            <a:pPr marL="432000" indent="-317880">
+            <a:pPr marL="432000" indent="-317160">
               <a:lnSpc>
                 <a:spcPct val="100000"/>
               </a:lnSpc>
@@ -8607,7 +8607,7 @@
             </a:endParaRPr>
           </a:p>
           <a:p>
-            <a:pPr marL="432000" indent="-317880">
+            <a:pPr marL="432000" indent="-317160">
               <a:lnSpc>
                 <a:spcPct val="100000"/>
               </a:lnSpc>
@@ -8636,7 +8636,7 @@
             </a:endParaRPr>
           </a:p>
           <a:p>
-            <a:pPr marL="432000" indent="-317880">
+            <a:pPr marL="432000" indent="-317160">
               <a:lnSpc>
                 <a:spcPct val="100000"/>
               </a:lnSpc>
@@ -8665,7 +8665,7 @@
             </a:endParaRPr>
           </a:p>
           <a:p>
-            <a:pPr marL="432000" indent="-317880">
+            <a:pPr marL="432000" indent="-317160">
               <a:lnSpc>
                 <a:spcPct val="100000"/>
               </a:lnSpc>
@@ -8753,7 +8753,7 @@
         <p:spPr>
           <a:xfrm>
             <a:off x="720000" y="300960"/>
-            <a:ext cx="8849520" cy="1256400"/>
+            <a:ext cx="8848800" cy="1255680"/>
           </a:xfrm>
           <a:prstGeom prst="rect">
             <a:avLst/>
@@ -8797,7 +8797,7 @@
         <p:spPr>
           <a:xfrm>
             <a:off x="720000" y="1944000"/>
-            <a:ext cx="8633880" cy="4378680"/>
+            <a:ext cx="8633160" cy="4377960"/>
           </a:xfrm>
           <a:prstGeom prst="rect">
             <a:avLst/>
@@ -8816,7 +8816,7 @@
         <p:txBody>
           <a:bodyPr lIns="0" rIns="0" tIns="0" bIns="0"/>
           <a:p>
-            <a:pPr marL="432000" indent="-317880">
+            <a:pPr marL="432000" indent="-317160">
               <a:lnSpc>
                 <a:spcPct val="100000"/>
               </a:lnSpc>
@@ -8885,7 +8885,7 @@
             </a:endParaRPr>
           </a:p>
           <a:p>
-            <a:pPr marL="432000" indent="-317880">
+            <a:pPr marL="432000" indent="-317160">
               <a:lnSpc>
                 <a:spcPct val="100000"/>
               </a:lnSpc>
@@ -8914,7 +8914,7 @@
             </a:endParaRPr>
           </a:p>
           <a:p>
-            <a:pPr marL="432000" indent="-317880">
+            <a:pPr marL="432000" indent="-317160">
               <a:lnSpc>
                 <a:spcPct val="100000"/>
               </a:lnSpc>
@@ -8943,7 +8943,7 @@
             </a:endParaRPr>
           </a:p>
           <a:p>
-            <a:pPr marL="432000" indent="-317880">
+            <a:pPr marL="432000" indent="-317160">
               <a:lnSpc>
                 <a:spcPct val="100000"/>
               </a:lnSpc>
@@ -9031,7 +9031,7 @@
         <p:spPr>
           <a:xfrm>
             <a:off x="720000" y="300960"/>
-            <a:ext cx="8849520" cy="1256400"/>
+            <a:ext cx="8848800" cy="1255680"/>
           </a:xfrm>
           <a:prstGeom prst="rect">
             <a:avLst/>
@@ -9075,7 +9075,7 @@
         <p:spPr>
           <a:xfrm>
             <a:off x="720000" y="1692000"/>
-            <a:ext cx="8633880" cy="5218920"/>
+            <a:ext cx="8633160" cy="5218200"/>
           </a:xfrm>
           <a:prstGeom prst="rect">
             <a:avLst/>
@@ -9094,7 +9094,7 @@
         <p:txBody>
           <a:bodyPr lIns="0" rIns="0" tIns="0" bIns="0"/>
           <a:p>
-            <a:pPr marL="432000" indent="-317880">
+            <a:pPr marL="432000" indent="-317160">
               <a:lnSpc>
                 <a:spcPct val="100000"/>
               </a:lnSpc>
@@ -9842,7 +9842,7 @@
         <p:spPr>
           <a:xfrm>
             <a:off x="720000" y="300960"/>
-            <a:ext cx="8849520" cy="1256400"/>
+            <a:ext cx="8848800" cy="1255680"/>
           </a:xfrm>
           <a:prstGeom prst="rect">
             <a:avLst/>
@@ -9886,7 +9886,7 @@
         <p:spPr>
           <a:xfrm>
             <a:off x="720000" y="1980000"/>
-            <a:ext cx="8633880" cy="4787640"/>
+            <a:ext cx="8633160" cy="4786920"/>
           </a:xfrm>
           <a:prstGeom prst="rect">
             <a:avLst/>
@@ -9905,7 +9905,7 @@
         <p:txBody>
           <a:bodyPr lIns="0" rIns="0" tIns="0" bIns="0"/>
           <a:p>
-            <a:pPr marL="432000" indent="-317880">
+            <a:pPr marL="432000" indent="-317160">
               <a:lnSpc>
                 <a:spcPct val="100000"/>
               </a:lnSpc>
@@ -10446,7 +10446,7 @@
         <p:spPr>
           <a:xfrm>
             <a:off x="720000" y="300960"/>
-            <a:ext cx="8849520" cy="1256400"/>
+            <a:ext cx="8848800" cy="1255680"/>
           </a:xfrm>
           <a:prstGeom prst="rect">
             <a:avLst/>
@@ -10490,7 +10490,7 @@
         <p:spPr>
           <a:xfrm>
             <a:off x="720000" y="2160000"/>
-            <a:ext cx="8633880" cy="4378680"/>
+            <a:ext cx="8633160" cy="4377960"/>
           </a:xfrm>
           <a:prstGeom prst="rect">
             <a:avLst/>
@@ -10509,7 +10509,7 @@
         <p:txBody>
           <a:bodyPr lIns="0" rIns="0" tIns="0" bIns="0"/>
           <a:p>
-            <a:pPr marL="432000" indent="-317880">
+            <a:pPr marL="432000" indent="-317160">
               <a:lnSpc>
                 <a:spcPct val="100000"/>
               </a:lnSpc>
@@ -10598,7 +10598,7 @@
             </a:endParaRPr>
           </a:p>
           <a:p>
-            <a:pPr marL="432000" indent="-317880">
+            <a:pPr marL="432000" indent="-317160">
               <a:lnSpc>
                 <a:spcPct val="100000"/>
               </a:lnSpc>
@@ -10786,7 +10786,7 @@
         <p:spPr>
           <a:xfrm>
             <a:off x="720000" y="300960"/>
-            <a:ext cx="8849520" cy="1256400"/>
+            <a:ext cx="8848800" cy="1255680"/>
           </a:xfrm>
           <a:prstGeom prst="rect">
             <a:avLst/>
@@ -10830,7 +10830,7 @@
         <p:spPr>
           <a:xfrm>
             <a:off x="720000" y="1584000"/>
-            <a:ext cx="8633880" cy="5327640"/>
+            <a:ext cx="8633160" cy="5326920"/>
           </a:xfrm>
           <a:prstGeom prst="rect">
             <a:avLst/>
@@ -10849,7 +10849,7 @@
         <p:txBody>
           <a:bodyPr lIns="0" rIns="0" tIns="0" bIns="0"/>
           <a:p>
-            <a:pPr marL="432000" indent="-317880">
+            <a:pPr marL="432000" indent="-317160">
               <a:lnSpc>
                 <a:spcPct val="100000"/>
               </a:lnSpc>
@@ -10898,7 +10898,7 @@
             </a:endParaRPr>
           </a:p>
           <a:p>
-            <a:pPr marL="432000" indent="-317880">
+            <a:pPr marL="432000" indent="-317160">
               <a:lnSpc>
                 <a:spcPct val="100000"/>
               </a:lnSpc>
@@ -10958,7 +10958,7 @@
             </a:endParaRPr>
           </a:p>
           <a:p>
-            <a:pPr marL="432000" indent="-317880">
+            <a:pPr marL="432000" indent="-317160">
               <a:lnSpc>
                 <a:spcPct val="100000"/>
               </a:lnSpc>
@@ -11007,7 +11007,7 @@
             </a:endParaRPr>
           </a:p>
           <a:p>
-            <a:pPr marL="432000" indent="-317880">
+            <a:pPr marL="432000" indent="-317160">
               <a:lnSpc>
                 <a:spcPct val="100000"/>
               </a:lnSpc>
@@ -11056,7 +11056,7 @@
             </a:endParaRPr>
           </a:p>
           <a:p>
-            <a:pPr marL="432000" indent="-317880">
+            <a:pPr marL="432000" indent="-317160">
               <a:lnSpc>
                 <a:spcPct val="100000"/>
               </a:lnSpc>
@@ -11085,7 +11085,7 @@
             </a:endParaRPr>
           </a:p>
           <a:p>
-            <a:pPr marL="432000" indent="-317880">
+            <a:pPr marL="432000" indent="-317160">
               <a:lnSpc>
                 <a:spcPct val="100000"/>
               </a:lnSpc>
@@ -11174,7 +11174,7 @@
         <p:spPr>
           <a:xfrm>
             <a:off x="720000" y="300960"/>
-            <a:ext cx="8849520" cy="1256400"/>
+            <a:ext cx="8848800" cy="1255680"/>
           </a:xfrm>
           <a:prstGeom prst="rect">
             <a:avLst/>
@@ -11218,7 +11218,7 @@
         <p:spPr>
           <a:xfrm>
             <a:off x="720000" y="1404000"/>
-            <a:ext cx="8633880" cy="5650560"/>
+            <a:ext cx="8633160" cy="5649840"/>
           </a:xfrm>
           <a:prstGeom prst="rect">
             <a:avLst/>
@@ -12456,7 +12456,7 @@
         <p:spPr>
           <a:xfrm>
             <a:off x="720000" y="300960"/>
-            <a:ext cx="8849520" cy="1256400"/>
+            <a:ext cx="8848800" cy="1255680"/>
           </a:xfrm>
           <a:prstGeom prst="rect">
             <a:avLst/>
@@ -12500,7 +12500,7 @@
         <p:spPr>
           <a:xfrm>
             <a:off x="720000" y="1872000"/>
-            <a:ext cx="8633880" cy="4570560"/>
+            <a:ext cx="8633160" cy="4569840"/>
           </a:xfrm>
           <a:prstGeom prst="rect">
             <a:avLst/>
@@ -13278,7 +13278,7 @@
         <p:spPr>
           <a:xfrm>
             <a:off x="720000" y="300960"/>
-            <a:ext cx="8849520" cy="1256400"/>
+            <a:ext cx="8848800" cy="1255680"/>
           </a:xfrm>
           <a:prstGeom prst="rect">
             <a:avLst/>
@@ -13322,7 +13322,7 @@
         <p:spPr>
           <a:xfrm>
             <a:off x="720000" y="1944000"/>
-            <a:ext cx="8633880" cy="4714560"/>
+            <a:ext cx="8633160" cy="4713840"/>
           </a:xfrm>
           <a:prstGeom prst="rect">
             <a:avLst/>
@@ -14190,7 +14190,7 @@
         <p:spPr>
           <a:xfrm>
             <a:off x="720000" y="300960"/>
-            <a:ext cx="8849520" cy="1256400"/>
+            <a:ext cx="8848800" cy="1255680"/>
           </a:xfrm>
           <a:prstGeom prst="rect">
             <a:avLst/>
@@ -14234,7 +14234,7 @@
         <p:spPr>
           <a:xfrm>
             <a:off x="720000" y="2052000"/>
-            <a:ext cx="8633880" cy="4426560"/>
+            <a:ext cx="8633160" cy="4425840"/>
           </a:xfrm>
           <a:prstGeom prst="rect">
             <a:avLst/>
@@ -14702,7 +14702,7 @@
         <p:spPr>
           <a:xfrm>
             <a:off x="720000" y="300960"/>
-            <a:ext cx="8849520" cy="1256400"/>
+            <a:ext cx="8848800" cy="1255680"/>
           </a:xfrm>
           <a:prstGeom prst="rect">
             <a:avLst/>
@@ -14746,7 +14746,7 @@
         <p:spPr>
           <a:xfrm>
             <a:off x="720000" y="1692000"/>
-            <a:ext cx="8633880" cy="4378680"/>
+            <a:ext cx="8633160" cy="4377960"/>
           </a:xfrm>
           <a:prstGeom prst="rect">
             <a:avLst/>
@@ -14765,7 +14765,7 @@
         <p:txBody>
           <a:bodyPr lIns="0" rIns="0" tIns="0" bIns="0"/>
           <a:p>
-            <a:pPr marL="432000" indent="-317880">
+            <a:pPr marL="432000" indent="-317160">
               <a:lnSpc>
                 <a:spcPct val="100000"/>
               </a:lnSpc>
@@ -14814,7 +14814,7 @@
             </a:endParaRPr>
           </a:p>
           <a:p>
-            <a:pPr marL="432000" indent="-317880">
+            <a:pPr marL="432000" indent="-317160">
               <a:lnSpc>
                 <a:spcPct val="100000"/>
               </a:lnSpc>
@@ -14854,7 +14854,7 @@
             </a:endParaRPr>
           </a:p>
           <a:p>
-            <a:pPr marL="432000" indent="-317880">
+            <a:pPr marL="432000" indent="-317160">
               <a:lnSpc>
                 <a:spcPct val="100000"/>
               </a:lnSpc>
@@ -14883,7 +14883,7 @@
             </a:endParaRPr>
           </a:p>
           <a:p>
-            <a:pPr marL="432000" indent="-317880">
+            <a:pPr marL="432000" indent="-317160">
               <a:lnSpc>
                 <a:spcPct val="100000"/>
               </a:lnSpc>
@@ -14912,7 +14912,7 @@
             </a:endParaRPr>
           </a:p>
           <a:p>
-            <a:pPr marL="432000" indent="-317880">
+            <a:pPr marL="432000" indent="-317160">
               <a:lnSpc>
                 <a:spcPct val="100000"/>
               </a:lnSpc>
@@ -15010,7 +15010,7 @@
         <p:spPr>
           <a:xfrm>
             <a:off x="720000" y="300960"/>
-            <a:ext cx="8849520" cy="1256400"/>
+            <a:ext cx="8848800" cy="1255680"/>
           </a:xfrm>
           <a:prstGeom prst="rect">
             <a:avLst/>
@@ -15054,7 +15054,7 @@
         <p:spPr>
           <a:xfrm>
             <a:off x="720000" y="2052000"/>
-            <a:ext cx="8633880" cy="4378680"/>
+            <a:ext cx="8633160" cy="4377960"/>
           </a:xfrm>
           <a:prstGeom prst="rect">
             <a:avLst/>
@@ -15073,7 +15073,7 @@
         <p:txBody>
           <a:bodyPr lIns="0" rIns="0" tIns="0" bIns="0"/>
           <a:p>
-            <a:pPr marL="432000" indent="-317880">
+            <a:pPr marL="432000" indent="-317160">
               <a:lnSpc>
                 <a:spcPct val="100000"/>
               </a:lnSpc>
@@ -15135,7 +15135,7 @@
             </a:endParaRPr>
           </a:p>
           <a:p>
-            <a:pPr marL="432000" indent="-317880">
+            <a:pPr marL="432000" indent="-317160">
               <a:lnSpc>
                 <a:spcPct val="100000"/>
               </a:lnSpc>
@@ -15175,7 +15175,7 @@
             </a:endParaRPr>
           </a:p>
           <a:p>
-            <a:pPr marL="432000" indent="-317880">
+            <a:pPr marL="432000" indent="-317160">
               <a:lnSpc>
                 <a:spcPct val="100000"/>
               </a:lnSpc>
@@ -15215,7 +15215,7 @@
             </a:endParaRPr>
           </a:p>
           <a:p>
-            <a:pPr marL="432000" indent="-317880">
+            <a:pPr marL="432000" indent="-317160">
               <a:lnSpc>
                 <a:spcPct val="100000"/>
               </a:lnSpc>
@@ -15314,7 +15314,7 @@
         <p:spPr>
           <a:xfrm>
             <a:off x="720000" y="300960"/>
-            <a:ext cx="8849520" cy="1256400"/>
+            <a:ext cx="8848800" cy="1255680"/>
           </a:xfrm>
           <a:prstGeom prst="rect">
             <a:avLst/>
@@ -15358,7 +15358,7 @@
         <p:spPr>
           <a:xfrm>
             <a:off x="720000" y="1404000"/>
-            <a:ext cx="8633880" cy="5650560"/>
+            <a:ext cx="8633160" cy="5649840"/>
           </a:xfrm>
           <a:prstGeom prst="rect">
             <a:avLst/>
@@ -16836,7 +16836,7 @@
         <p:spPr>
           <a:xfrm>
             <a:off x="720000" y="300960"/>
-            <a:ext cx="8849520" cy="1256400"/>
+            <a:ext cx="8848800" cy="1255680"/>
           </a:xfrm>
           <a:prstGeom prst="rect">
             <a:avLst/>
@@ -16880,7 +16880,7 @@
         <p:spPr>
           <a:xfrm>
             <a:off x="720000" y="2160000"/>
-            <a:ext cx="8633880" cy="4378680"/>
+            <a:ext cx="8633160" cy="4377960"/>
           </a:xfrm>
           <a:prstGeom prst="rect">
             <a:avLst/>
@@ -16899,7 +16899,7 @@
         <p:txBody>
           <a:bodyPr lIns="0" rIns="0" tIns="0" bIns="0"/>
           <a:p>
-            <a:pPr marL="432000" indent="-317880">
+            <a:pPr marL="432000" indent="-317160">
               <a:lnSpc>
                 <a:spcPct val="100000"/>
               </a:lnSpc>
@@ -16968,7 +16968,7 @@
             </a:endParaRPr>
           </a:p>
           <a:p>
-            <a:pPr marL="432000" indent="-317880">
+            <a:pPr marL="432000" indent="-317160">
               <a:lnSpc>
                 <a:spcPct val="100000"/>
               </a:lnSpc>
@@ -16997,7 +16997,7 @@
             </a:endParaRPr>
           </a:p>
           <a:p>
-            <a:pPr marL="432000" indent="-317880">
+            <a:pPr marL="432000" indent="-317160">
               <a:lnSpc>
                 <a:spcPct val="100000"/>
               </a:lnSpc>
@@ -17085,7 +17085,7 @@
         <p:spPr>
           <a:xfrm>
             <a:off x="720000" y="300960"/>
-            <a:ext cx="8849520" cy="1256400"/>
+            <a:ext cx="8848800" cy="1255680"/>
           </a:xfrm>
           <a:prstGeom prst="rect">
             <a:avLst/>
@@ -17129,7 +17129,7 @@
         <p:spPr>
           <a:xfrm>
             <a:off x="720000" y="2160000"/>
-            <a:ext cx="8633880" cy="4378680"/>
+            <a:ext cx="8633160" cy="4377960"/>
           </a:xfrm>
           <a:prstGeom prst="rect">
             <a:avLst/>
@@ -17148,7 +17148,7 @@
         <p:txBody>
           <a:bodyPr lIns="0" rIns="0" tIns="0" bIns="0"/>
           <a:p>
-            <a:pPr marL="432000" indent="-317880">
+            <a:pPr marL="432000" indent="-317160">
               <a:lnSpc>
                 <a:spcPct val="100000"/>
               </a:lnSpc>
@@ -17177,7 +17177,7 @@
             </a:endParaRPr>
           </a:p>
           <a:p>
-            <a:pPr marL="432000" indent="-317880">
+            <a:pPr marL="432000" indent="-317160">
               <a:lnSpc>
                 <a:spcPct val="100000"/>
               </a:lnSpc>
@@ -17206,7 +17206,7 @@
             </a:endParaRPr>
           </a:p>
           <a:p>
-            <a:pPr marL="432000" indent="-317880">
+            <a:pPr marL="432000" indent="-317160">
               <a:lnSpc>
                 <a:spcPct val="100000"/>
               </a:lnSpc>
@@ -17235,7 +17235,7 @@
             </a:endParaRPr>
           </a:p>
           <a:p>
-            <a:pPr marL="432000" indent="-317880">
+            <a:pPr marL="432000" indent="-317160">
               <a:lnSpc>
                 <a:spcPct val="100000"/>
               </a:lnSpc>
@@ -17323,7 +17323,7 @@
         <p:spPr>
           <a:xfrm>
             <a:off x="720000" y="300960"/>
-            <a:ext cx="8849520" cy="1256400"/>
+            <a:ext cx="8848800" cy="1255680"/>
           </a:xfrm>
           <a:prstGeom prst="rect">
             <a:avLst/>
@@ -17367,7 +17367,7 @@
         <p:spPr>
           <a:xfrm>
             <a:off x="964440" y="2160000"/>
-            <a:ext cx="8145000" cy="2873160"/>
+            <a:ext cx="8144280" cy="2872440"/>
           </a:xfrm>
           <a:prstGeom prst="rect">
             <a:avLst/>
@@ -17391,7 +17391,7 @@
             </a:endParaRPr>
           </a:p>
           <a:p>
-            <a:pPr marL="432000" indent="-317880">
+            <a:pPr marL="432000" indent="-317160">
               <a:lnSpc>
                 <a:spcPct val="100000"/>
               </a:lnSpc>
@@ -17420,7 +17420,7 @@
             </a:endParaRPr>
           </a:p>
           <a:p>
-            <a:pPr marL="432000" indent="-317880">
+            <a:pPr marL="432000" indent="-317160">
               <a:lnSpc>
                 <a:spcPct val="100000"/>
               </a:lnSpc>
@@ -17449,7 +17449,7 @@
             </a:endParaRPr>
           </a:p>
           <a:p>
-            <a:pPr marL="432000" indent="-317880">
+            <a:pPr marL="432000" indent="-317160">
               <a:lnSpc>
                 <a:spcPct val="100000"/>
               </a:lnSpc>
@@ -17548,7 +17548,7 @@
         <p:spPr>
           <a:xfrm>
             <a:off x="720000" y="300960"/>
-            <a:ext cx="8849520" cy="1256400"/>
+            <a:ext cx="8848800" cy="1255680"/>
           </a:xfrm>
           <a:prstGeom prst="rect">
             <a:avLst/>
@@ -17592,7 +17592,7 @@
         <p:spPr>
           <a:xfrm>
             <a:off x="720000" y="2160000"/>
-            <a:ext cx="8633880" cy="4378680"/>
+            <a:ext cx="8633160" cy="4377960"/>
           </a:xfrm>
           <a:prstGeom prst="rect">
             <a:avLst/>
@@ -17641,7 +17641,7 @@
             </a:endParaRPr>
           </a:p>
           <a:p>
-            <a:pPr marL="432000" indent="-317880">
+            <a:pPr marL="432000" indent="-317160">
               <a:lnSpc>
                 <a:spcPct val="100000"/>
               </a:lnSpc>
@@ -17690,7 +17690,7 @@
             </a:endParaRPr>
           </a:p>
           <a:p>
-            <a:pPr marL="432000" indent="-317880">
+            <a:pPr marL="432000" indent="-317160">
               <a:lnSpc>
                 <a:spcPct val="100000"/>
               </a:lnSpc>
@@ -17800,7 +17800,7 @@
         <p:spPr>
           <a:xfrm>
             <a:off x="720000" y="300960"/>
-            <a:ext cx="8849520" cy="1256400"/>
+            <a:ext cx="8848800" cy="1255680"/>
           </a:xfrm>
           <a:prstGeom prst="rect">
             <a:avLst/>
@@ -17844,7 +17844,7 @@
         <p:spPr>
           <a:xfrm>
             <a:off x="720000" y="1836000"/>
-            <a:ext cx="8633880" cy="5003280"/>
+            <a:ext cx="8633160" cy="5002560"/>
           </a:xfrm>
           <a:prstGeom prst="rect">
             <a:avLst/>
@@ -17863,7 +17863,7 @@
         <p:txBody>
           <a:bodyPr lIns="0" rIns="0" tIns="0" bIns="0"/>
           <a:p>
-            <a:pPr marL="432000" indent="-317880">
+            <a:pPr marL="432000" indent="-317160">
               <a:lnSpc>
                 <a:spcPct val="100000"/>
               </a:lnSpc>
@@ -17923,7 +17923,7 @@
             </a:endParaRPr>
           </a:p>
           <a:p>
-            <a:pPr marL="432000" indent="-317880">
+            <a:pPr marL="432000" indent="-317160">
               <a:lnSpc>
                 <a:spcPct val="100000"/>
               </a:lnSpc>
@@ -18024,7 +18024,7 @@
             </a:endParaRPr>
           </a:p>
           <a:p>
-            <a:pPr marL="432000" indent="-317880">
+            <a:pPr marL="432000" indent="-317160">
               <a:lnSpc>
                 <a:spcPct val="100000"/>
               </a:lnSpc>
@@ -18112,7 +18112,7 @@
         <p:spPr>
           <a:xfrm>
             <a:off x="720000" y="300960"/>
-            <a:ext cx="8849520" cy="1256400"/>
+            <a:ext cx="8848800" cy="1255680"/>
           </a:xfrm>
           <a:prstGeom prst="rect">
             <a:avLst/>
@@ -18156,7 +18156,7 @@
         <p:spPr>
           <a:xfrm>
             <a:off x="720000" y="2160000"/>
-            <a:ext cx="8633880" cy="4378680"/>
+            <a:ext cx="8633160" cy="4377960"/>
           </a:xfrm>
           <a:prstGeom prst="rect">
             <a:avLst/>
@@ -18488,7 +18488,7 @@
         <p:spPr>
           <a:xfrm>
             <a:off x="720000" y="300960"/>
-            <a:ext cx="8849520" cy="1256400"/>
+            <a:ext cx="8848800" cy="1255680"/>
           </a:xfrm>
           <a:prstGeom prst="rect">
             <a:avLst/>
@@ -18532,7 +18532,7 @@
         <p:spPr>
           <a:xfrm>
             <a:off x="720000" y="2160000"/>
-            <a:ext cx="8633880" cy="4378680"/>
+            <a:ext cx="8633160" cy="4377960"/>
           </a:xfrm>
           <a:prstGeom prst="rect">
             <a:avLst/>
@@ -18779,7 +18779,7 @@
         <p:spPr>
           <a:xfrm>
             <a:off x="720000" y="300960"/>
-            <a:ext cx="8849520" cy="1256400"/>
+            <a:ext cx="8848800" cy="1255680"/>
           </a:xfrm>
           <a:prstGeom prst="rect">
             <a:avLst/>
@@ -18823,7 +18823,7 @@
         <p:spPr>
           <a:xfrm>
             <a:off x="720000" y="2160000"/>
-            <a:ext cx="8633880" cy="4378680"/>
+            <a:ext cx="8633160" cy="4377960"/>
           </a:xfrm>
           <a:prstGeom prst="rect">
             <a:avLst/>
@@ -19157,7 +19157,7 @@
         <p:spPr>
           <a:xfrm>
             <a:off x="720000" y="240120"/>
-            <a:ext cx="8849520" cy="1378080"/>
+            <a:ext cx="8848800" cy="1377360"/>
           </a:xfrm>
           <a:prstGeom prst="rect">
             <a:avLst/>
@@ -19201,7 +19201,7 @@
         <p:spPr>
           <a:xfrm>
             <a:off x="720000" y="2484000"/>
-            <a:ext cx="8633880" cy="3743640"/>
+            <a:ext cx="8633160" cy="3742920"/>
           </a:xfrm>
           <a:prstGeom prst="rect">
             <a:avLst/>
@@ -19457,7 +19457,7 @@
         <p:spPr>
           <a:xfrm>
             <a:off x="720000" y="300960"/>
-            <a:ext cx="8849520" cy="1256400"/>
+            <a:ext cx="8848800" cy="1255680"/>
           </a:xfrm>
           <a:prstGeom prst="rect">
             <a:avLst/>
@@ -19501,7 +19501,7 @@
         <p:spPr>
           <a:xfrm>
             <a:off x="720000" y="1872000"/>
-            <a:ext cx="8633880" cy="4378680"/>
+            <a:ext cx="8633160" cy="4377960"/>
           </a:xfrm>
           <a:prstGeom prst="rect">
             <a:avLst/>
@@ -19520,7 +19520,7 @@
         <p:txBody>
           <a:bodyPr lIns="0" rIns="0" tIns="0" bIns="0"/>
           <a:p>
-            <a:pPr marL="432000" indent="-317880">
+            <a:pPr marL="432000" indent="-317160">
               <a:lnSpc>
                 <a:spcPct val="100000"/>
               </a:lnSpc>
@@ -19549,7 +19549,7 @@
             </a:endParaRPr>
           </a:p>
           <a:p>
-            <a:pPr marL="432000" indent="-317880">
+            <a:pPr marL="432000" indent="-317160">
               <a:lnSpc>
                 <a:spcPct val="100000"/>
               </a:lnSpc>
@@ -19609,7 +19609,7 @@
             </a:endParaRPr>
           </a:p>
           <a:p>
-            <a:pPr marL="432000" indent="-317880">
+            <a:pPr marL="432000" indent="-317160">
               <a:lnSpc>
                 <a:spcPct val="100000"/>
               </a:lnSpc>
@@ -19669,7 +19669,7 @@
             </a:endParaRPr>
           </a:p>
           <a:p>
-            <a:pPr marL="432000" indent="-317880">
+            <a:pPr marL="432000" indent="-317160">
               <a:lnSpc>
                 <a:spcPct val="100000"/>
               </a:lnSpc>
@@ -19698,7 +19698,7 @@
             </a:endParaRPr>
           </a:p>
           <a:p>
-            <a:pPr marL="432000" indent="-317880">
+            <a:pPr marL="432000" indent="-317160">
               <a:lnSpc>
                 <a:spcPct val="100000"/>
               </a:lnSpc>
@@ -19786,7 +19786,7 @@
         <p:spPr>
           <a:xfrm>
             <a:off x="720000" y="300960"/>
-            <a:ext cx="8849520" cy="1256400"/>
+            <a:ext cx="8848800" cy="1255680"/>
           </a:xfrm>
           <a:prstGeom prst="rect">
             <a:avLst/>
@@ -19830,7 +19830,7 @@
         <p:spPr>
           <a:xfrm>
             <a:off x="720000" y="2160000"/>
-            <a:ext cx="8633880" cy="4378680"/>
+            <a:ext cx="8633160" cy="4377960"/>
           </a:xfrm>
           <a:prstGeom prst="rect">
             <a:avLst/>
@@ -19867,7 +19867,7 @@
             </a:endParaRPr>
           </a:p>
           <a:p>
-            <a:pPr marL="432000" indent="-317880">
+            <a:pPr marL="432000" indent="-317160">
               <a:lnSpc>
                 <a:spcPct val="100000"/>
               </a:lnSpc>
@@ -19916,7 +19916,7 @@
             </a:endParaRPr>
           </a:p>
           <a:p>
-            <a:pPr marL="432000" indent="-317880">
+            <a:pPr marL="432000" indent="-317160">
               <a:lnSpc>
                 <a:spcPct val="100000"/>
               </a:lnSpc>
@@ -20024,7 +20024,7 @@
         <p:spPr>
           <a:xfrm>
             <a:off x="720000" y="300960"/>
-            <a:ext cx="8849520" cy="1256400"/>
+            <a:ext cx="8848800" cy="1255680"/>
           </a:xfrm>
           <a:prstGeom prst="rect">
             <a:avLst/>
@@ -20068,7 +20068,7 @@
         <p:spPr>
           <a:xfrm>
             <a:off x="720000" y="2160000"/>
-            <a:ext cx="8633880" cy="4378680"/>
+            <a:ext cx="8633160" cy="4377960"/>
           </a:xfrm>
           <a:prstGeom prst="rect">
             <a:avLst/>
@@ -20092,7 +20092,7 @@
             </a:endParaRPr>
           </a:p>
           <a:p>
-            <a:pPr marL="432000" indent="-317880">
+            <a:pPr marL="432000" indent="-317160">
               <a:lnSpc>
                 <a:spcPct val="100000"/>
               </a:lnSpc>
@@ -20121,7 +20121,7 @@
             </a:endParaRPr>
           </a:p>
           <a:p>
-            <a:pPr marL="432000" indent="-317880">
+            <a:pPr marL="432000" indent="-317160">
               <a:lnSpc>
                 <a:spcPct val="100000"/>
               </a:lnSpc>
@@ -20429,7 +20429,7 @@
         <p:spPr>
           <a:xfrm>
             <a:off x="720000" y="300960"/>
-            <a:ext cx="8849520" cy="1256400"/>
+            <a:ext cx="8848800" cy="1255680"/>
           </a:xfrm>
           <a:prstGeom prst="rect">
             <a:avLst/>
@@ -20473,7 +20473,7 @@
         <p:spPr>
           <a:xfrm>
             <a:off x="720000" y="2088000"/>
-            <a:ext cx="8633880" cy="4378680"/>
+            <a:ext cx="8633160" cy="4377960"/>
           </a:xfrm>
           <a:prstGeom prst="rect">
             <a:avLst/>
@@ -20492,7 +20492,7 @@
         <p:txBody>
           <a:bodyPr lIns="0" rIns="0" tIns="0" bIns="0"/>
           <a:p>
-            <a:pPr marL="432000" indent="-317880">
+            <a:pPr marL="432000" indent="-317160">
               <a:lnSpc>
                 <a:spcPct val="100000"/>
               </a:lnSpc>
@@ -20561,7 +20561,7 @@
             </a:endParaRPr>
           </a:p>
           <a:p>
-            <a:pPr marL="432000" indent="-317880">
+            <a:pPr marL="432000" indent="-317160">
               <a:lnSpc>
                 <a:spcPct val="100000"/>
               </a:lnSpc>
@@ -20590,7 +20590,7 @@
             </a:endParaRPr>
           </a:p>
           <a:p>
-            <a:pPr marL="432000" indent="-317880">
+            <a:pPr marL="432000" indent="-317160">
               <a:lnSpc>
                 <a:spcPct val="100000"/>
               </a:lnSpc>
@@ -20619,7 +20619,7 @@
             </a:endParaRPr>
           </a:p>
           <a:p>
-            <a:pPr marL="432000" indent="-317880">
+            <a:pPr marL="432000" indent="-317160">
               <a:lnSpc>
                 <a:spcPct val="100000"/>
               </a:lnSpc>
@@ -20648,7 +20648,7 @@
             </a:endParaRPr>
           </a:p>
           <a:p>
-            <a:pPr marL="432000" indent="-317880">
+            <a:pPr marL="432000" indent="-317160">
               <a:lnSpc>
                 <a:spcPct val="100000"/>
               </a:lnSpc>
@@ -20677,7 +20677,7 @@
             </a:endParaRPr>
           </a:p>
           <a:p>
-            <a:pPr marL="432000" indent="-317880">
+            <a:pPr marL="432000" indent="-317160">
               <a:lnSpc>
                 <a:spcPct val="100000"/>
               </a:lnSpc>
@@ -20775,7 +20775,7 @@
         <p:spPr>
           <a:xfrm>
             <a:off x="720000" y="300960"/>
-            <a:ext cx="8849520" cy="1256400"/>
+            <a:ext cx="8848800" cy="1255680"/>
           </a:xfrm>
           <a:prstGeom prst="rect">
             <a:avLst/>
@@ -20819,7 +20819,7 @@
         <p:spPr>
           <a:xfrm>
             <a:off x="756000" y="2160000"/>
-            <a:ext cx="8633880" cy="4378680"/>
+            <a:ext cx="8633160" cy="4377960"/>
           </a:xfrm>
           <a:prstGeom prst="rect">
             <a:avLst/>
@@ -20838,7 +20838,7 @@
         <p:txBody>
           <a:bodyPr lIns="0" rIns="0" tIns="0" bIns="0"/>
           <a:p>
-            <a:pPr marL="432000" indent="-317880">
+            <a:pPr marL="432000" indent="-317160">
               <a:lnSpc>
                 <a:spcPct val="100000"/>
               </a:lnSpc>
@@ -20889,7 +20889,7 @@
             </a:endParaRPr>
           </a:p>
           <a:p>
-            <a:pPr marL="432000" indent="-317880">
+            <a:pPr marL="432000" indent="-317160">
               <a:lnSpc>
                 <a:spcPct val="100000"/>
               </a:lnSpc>
@@ -20940,7 +20940,7 @@
             </a:endParaRPr>
           </a:p>
           <a:p>
-            <a:pPr marL="432000" indent="-317880">
+            <a:pPr marL="432000" indent="-317160">
               <a:lnSpc>
                 <a:spcPct val="100000"/>
               </a:lnSpc>
@@ -21060,7 +21060,7 @@
         <p:spPr>
           <a:xfrm>
             <a:off x="720000" y="300960"/>
-            <a:ext cx="8849520" cy="1256400"/>
+            <a:ext cx="8848800" cy="1255680"/>
           </a:xfrm>
           <a:prstGeom prst="rect">
             <a:avLst/>
@@ -21104,7 +21104,7 @@
         <p:spPr>
           <a:xfrm>
             <a:off x="756000" y="2160000"/>
-            <a:ext cx="8633880" cy="4378680"/>
+            <a:ext cx="8633160" cy="4377960"/>
           </a:xfrm>
           <a:prstGeom prst="rect">
             <a:avLst/>
@@ -21123,7 +21123,7 @@
         <p:txBody>
           <a:bodyPr lIns="0" rIns="0" tIns="0" bIns="0"/>
           <a:p>
-            <a:pPr marL="432000" indent="-317880">
+            <a:pPr marL="432000" indent="-317160">
               <a:lnSpc>
                 <a:spcPct val="100000"/>
               </a:lnSpc>
@@ -21174,7 +21174,7 @@
             </a:endParaRPr>
           </a:p>
           <a:p>
-            <a:pPr marL="432000" indent="-317880">
+            <a:pPr marL="432000" indent="-317160">
               <a:lnSpc>
                 <a:spcPct val="100000"/>
               </a:lnSpc>
@@ -21215,7 +21215,7 @@
             </a:endParaRPr>
           </a:p>
           <a:p>
-            <a:pPr marL="432000" indent="-317880">
+            <a:pPr marL="432000" indent="-317160">
               <a:lnSpc>
                 <a:spcPct val="100000"/>
               </a:lnSpc>
@@ -21256,7 +21256,7 @@
             </a:endParaRPr>
           </a:p>
           <a:p>
-            <a:pPr marL="432000" indent="-317880">
+            <a:pPr marL="432000" indent="-317160">
               <a:lnSpc>
                 <a:spcPct val="100000"/>
               </a:lnSpc>
@@ -21376,7 +21376,7 @@
         <p:spPr>
           <a:xfrm>
             <a:off x="720000" y="300960"/>
-            <a:ext cx="8849520" cy="1256400"/>
+            <a:ext cx="8848800" cy="1255680"/>
           </a:xfrm>
           <a:prstGeom prst="rect">
             <a:avLst/>
@@ -21420,7 +21420,7 @@
         <p:spPr>
           <a:xfrm>
             <a:off x="756000" y="2124000"/>
-            <a:ext cx="8633880" cy="4378680"/>
+            <a:ext cx="8633160" cy="4377960"/>
           </a:xfrm>
           <a:prstGeom prst="rect">
             <a:avLst/>
@@ -21439,7 +21439,7 @@
         <p:txBody>
           <a:bodyPr lIns="0" rIns="0" tIns="0" bIns="0"/>
           <a:p>
-            <a:pPr marL="432000" indent="-317880">
+            <a:pPr marL="432000" indent="-317160">
               <a:lnSpc>
                 <a:spcPct val="100000"/>
               </a:lnSpc>
@@ -21490,7 +21490,7 @@
             </a:endParaRPr>
           </a:p>
           <a:p>
-            <a:pPr marL="432000" indent="-317880">
+            <a:pPr marL="432000" indent="-317160">
               <a:lnSpc>
                 <a:spcPct val="100000"/>
               </a:lnSpc>
@@ -21621,7 +21621,7 @@
         <p:spPr>
           <a:xfrm>
             <a:off x="720000" y="300960"/>
-            <a:ext cx="8849520" cy="1256400"/>
+            <a:ext cx="8848800" cy="1255680"/>
           </a:xfrm>
           <a:prstGeom prst="rect">
             <a:avLst/>
@@ -21665,7 +21665,7 @@
         <p:spPr>
           <a:xfrm>
             <a:off x="720000" y="2160000"/>
-            <a:ext cx="8633880" cy="4378680"/>
+            <a:ext cx="8633160" cy="4377960"/>
           </a:xfrm>
           <a:prstGeom prst="rect">
             <a:avLst/>
@@ -21727,6 +21727,54 @@
                 <a:ea typeface="DejaVu Sans"/>
               </a:rPr>
               <a:t>Q &amp; A</a:t>
+            </a:r>
+            <a:endParaRPr b="0" lang="de-DE" sz="8000" spc="-1" strike="noStrike">
+              <a:latin typeface="Arial"/>
+            </a:endParaRPr>
+          </a:p>
+          <a:p>
+            <a:pPr algn="ctr">
+              <a:lnSpc>
+                <a:spcPct val="100000"/>
+              </a:lnSpc>
+              <a:spcAft>
+                <a:spcPts val="1414"/>
+              </a:spcAft>
+            </a:pPr>
+            <a:endParaRPr b="0" lang="de-DE" sz="8000" spc="-1" strike="noStrike">
+              <a:latin typeface="Arial"/>
+            </a:endParaRPr>
+          </a:p>
+          <a:p>
+            <a:pPr algn="ctr">
+              <a:lnSpc>
+                <a:spcPct val="100000"/>
+              </a:lnSpc>
+              <a:spcAft>
+                <a:spcPts val="1414"/>
+              </a:spcAft>
+            </a:pPr>
+            <a:r>
+              <a:rPr b="0" lang="de-DE" sz="2000" spc="-1" strike="noStrike" u="sng">
+                <a:solidFill>
+                  <a:srgbClr val="0000ff"/>
+                </a:solidFill>
+                <a:uFillTx/>
+                <a:latin typeface="Noto Sans Regular"/>
+                <a:ea typeface="DejaVu Sans"/>
+                <a:hlinkClick r:id="rId1"/>
+              </a:rPr>
+              <a:t>https://github.com/hermannhueck/typeclasses</a:t>
+            </a:r>
+            <a:r>
+              <a:rPr b="0" lang="de-DE" sz="2400" spc="-1" strike="noStrike">
+                <a:solidFill>
+                  <a:srgbClr val="333333"/>
+                </a:solidFill>
+                <a:latin typeface="Noto Sans Regular"/>
+                <a:ea typeface="DejaVu Sans"/>
+              </a:rPr>
+              <a:t> </a:t>
             </a:r>
             <a:r>
               <a:rPr b="0" lang="de-DE" sz="2800" spc="-1" strike="noStrike">
@@ -21812,7 +21860,7 @@
         <p:spPr>
           <a:xfrm>
             <a:off x="720000" y="300960"/>
-            <a:ext cx="8849520" cy="1256400"/>
+            <a:ext cx="8848800" cy="1255680"/>
           </a:xfrm>
           <a:prstGeom prst="rect">
             <a:avLst/>
@@ -21856,7 +21904,7 @@
         <p:spPr>
           <a:xfrm>
             <a:off x="720000" y="2160000"/>
-            <a:ext cx="8633880" cy="4378680"/>
+            <a:ext cx="8633160" cy="4377960"/>
           </a:xfrm>
           <a:prstGeom prst="rect">
             <a:avLst/>
@@ -21875,7 +21923,7 @@
         <p:txBody>
           <a:bodyPr lIns="0" rIns="0" tIns="0" bIns="0"/>
           <a:p>
-            <a:pPr marL="432000" indent="-317880">
+            <a:pPr marL="432000" indent="-317160">
               <a:lnSpc>
                 <a:spcPct val="100000"/>
               </a:lnSpc>
@@ -21904,7 +21952,7 @@
             </a:endParaRPr>
           </a:p>
           <a:p>
-            <a:pPr marL="432000" indent="-317880">
+            <a:pPr marL="432000" indent="-317160">
               <a:lnSpc>
                 <a:spcPct val="100000"/>
               </a:lnSpc>
@@ -21933,7 +21981,7 @@
             </a:endParaRPr>
           </a:p>
           <a:p>
-            <a:pPr marL="432000" indent="-317880">
+            <a:pPr marL="432000" indent="-317160">
               <a:lnSpc>
                 <a:spcPct val="100000"/>
               </a:lnSpc>
@@ -21962,7 +22010,7 @@
             </a:endParaRPr>
           </a:p>
           <a:p>
-            <a:pPr marL="432000" indent="-317880">
+            <a:pPr marL="432000" indent="-317160">
               <a:lnSpc>
                 <a:spcPct val="100000"/>
               </a:lnSpc>
@@ -22090,7 +22138,7 @@
         <p:spPr>
           <a:xfrm>
             <a:off x="720000" y="300960"/>
-            <a:ext cx="8849520" cy="1256400"/>
+            <a:ext cx="8848800" cy="1255680"/>
           </a:xfrm>
           <a:prstGeom prst="rect">
             <a:avLst/>
@@ -22134,7 +22182,7 @@
         <p:spPr>
           <a:xfrm>
             <a:off x="720000" y="2160000"/>
-            <a:ext cx="8633880" cy="4378680"/>
+            <a:ext cx="8633160" cy="4377960"/>
           </a:xfrm>
           <a:prstGeom prst="rect">
             <a:avLst/>
@@ -22782,7 +22830,7 @@
         <p:spPr>
           <a:xfrm>
             <a:off x="720000" y="300960"/>
-            <a:ext cx="8849520" cy="1256400"/>
+            <a:ext cx="8848800" cy="1255680"/>
           </a:xfrm>
           <a:prstGeom prst="rect">
             <a:avLst/>
@@ -22826,7 +22874,7 @@
         <p:spPr>
           <a:xfrm>
             <a:off x="720000" y="2160000"/>
-            <a:ext cx="8633880" cy="4378680"/>
+            <a:ext cx="8633160" cy="4377960"/>
           </a:xfrm>
           <a:prstGeom prst="rect">
             <a:avLst/>
@@ -23489,7 +23537,7 @@
         <p:spPr>
           <a:xfrm>
             <a:off x="720000" y="300960"/>
-            <a:ext cx="8849520" cy="1256400"/>
+            <a:ext cx="8848800" cy="1255680"/>
           </a:xfrm>
           <a:prstGeom prst="rect">
             <a:avLst/>
@@ -23533,7 +23581,7 @@
         <p:spPr>
           <a:xfrm>
             <a:off x="720000" y="2160000"/>
-            <a:ext cx="8633880" cy="4378680"/>
+            <a:ext cx="8633160" cy="4377960"/>
           </a:xfrm>
           <a:prstGeom prst="rect">
             <a:avLst/>
@@ -24351,7 +24399,7 @@
         <p:spPr>
           <a:xfrm>
             <a:off x="720000" y="300960"/>
-            <a:ext cx="8849520" cy="1256400"/>
+            <a:ext cx="8848800" cy="1255680"/>
           </a:xfrm>
           <a:prstGeom prst="rect">
             <a:avLst/>
@@ -24395,7 +24443,7 @@
         <p:spPr>
           <a:xfrm>
             <a:off x="720000" y="2160000"/>
-            <a:ext cx="8633880" cy="4378680"/>
+            <a:ext cx="8633160" cy="4377960"/>
           </a:xfrm>
           <a:prstGeom prst="rect">
             <a:avLst/>
@@ -24414,7 +24462,7 @@
         <p:txBody>
           <a:bodyPr lIns="0" rIns="0" tIns="0" bIns="0"/>
           <a:p>
-            <a:pPr marL="432000" indent="-317880">
+            <a:pPr marL="432000" indent="-317160">
               <a:lnSpc>
                 <a:spcPct val="100000"/>
               </a:lnSpc>
@@ -24443,7 +24491,7 @@
             </a:endParaRPr>
           </a:p>
           <a:p>
-            <a:pPr marL="432000" indent="-317880">
+            <a:pPr marL="432000" indent="-317160">
               <a:lnSpc>
                 <a:spcPct val="100000"/>
               </a:lnSpc>
@@ -24472,7 +24520,7 @@
             </a:endParaRPr>
           </a:p>
           <a:p>
-            <a:pPr marL="432000" indent="-317880">
+            <a:pPr marL="432000" indent="-317160">
               <a:lnSpc>
                 <a:spcPct val="100000"/>
               </a:lnSpc>
@@ -24501,7 +24549,7 @@
             </a:endParaRPr>
           </a:p>
           <a:p>
-            <a:pPr marL="432000" indent="-317880">
+            <a:pPr marL="432000" indent="-317160">
               <a:lnSpc>
                 <a:spcPct val="100000"/>
               </a:lnSpc>
@@ -24530,7 +24578,7 @@
             </a:endParaRPr>
           </a:p>
           <a:p>
-            <a:pPr marL="432000" indent="-317880">
+            <a:pPr marL="432000" indent="-317160">
               <a:lnSpc>
                 <a:spcPct val="100000"/>
               </a:lnSpc>

</xml_diff>